<commit_message>
adding recommendations to presentation slides
</commit_message>
<xml_diff>
--- a/presentation.pdf.pptx
+++ b/presentation.pdf.pptx
@@ -15,6 +15,7 @@
     <p:sldId id="264" r:id="rId9"/>
     <p:sldId id="265" r:id="rId10"/>
     <p:sldId id="266" r:id="rId11"/>
+    <p:sldId id="267" r:id="rId12"/>
   </p:sldIdLst>
   <p:sldSz cx="12192000" cy="6858000"/>
   <p:notesSz cx="6858000" cy="9144000"/>
@@ -3555,11 +3556,11 @@
           </a:p>
           <a:p>
             <a:r>
-              <a:rPr lang="en-US" b="1"/>
+              <a:rPr lang="en-US" b="1" dirty="0"/>
               <a:t>Fairness:</a:t>
             </a:r>
             <a:r>
-              <a:rPr lang="en-US"/>
+              <a:rPr lang="en-US" dirty="0"/>
               <a:t> Encoded demographic features (e.g., gender, senior citizen status) allow for analysis of potential model bias, supporting ethical and balanced decision-making.</a:t>
             </a:r>
           </a:p>
@@ -3575,6 +3576,210 @@
     <p:extLst>
       <p:ext uri="{BB962C8B-B14F-4D97-AF65-F5344CB8AC3E}">
         <p14:creationId xmlns:p14="http://schemas.microsoft.com/office/powerpoint/2010/main" val="2821246141"/>
+      </p:ext>
+    </p:extLst>
+  </p:cSld>
+  <p:clrMapOvr>
+    <a:masterClrMapping/>
+  </p:clrMapOvr>
+</p:sld>
+</file>
+
+<file path=ppt/slides/slide11.xml><?xml version="1.0" encoding="utf-8"?>
+<p:sld xmlns:a="http://schemas.openxmlformats.org/drawingml/2006/main" xmlns:r="http://schemas.openxmlformats.org/officeDocument/2006/relationships" xmlns:p="http://schemas.openxmlformats.org/presentationml/2006/main">
+  <p:cSld>
+    <p:spTree>
+      <p:nvGrpSpPr>
+        <p:cNvPr id="1" name=""/>
+        <p:cNvGrpSpPr/>
+        <p:nvPr/>
+      </p:nvGrpSpPr>
+      <p:grpSpPr>
+        <a:xfrm>
+          <a:off x="0" y="0"/>
+          <a:ext cx="0" cy="0"/>
+          <a:chOff x="0" y="0"/>
+          <a:chExt cx="0" cy="0"/>
+        </a:xfrm>
+      </p:grpSpPr>
+      <p:sp>
+        <p:nvSpPr>
+          <p:cNvPr id="2" name="Title 1">
+            <a:extLst>
+              <a:ext uri="{FF2B5EF4-FFF2-40B4-BE49-F238E27FC236}">
+                <a16:creationId xmlns:a16="http://schemas.microsoft.com/office/drawing/2014/main" id="{C1273695-A8D9-3BC8-E908-A80B08DB94BF}"/>
+              </a:ext>
+            </a:extLst>
+          </p:cNvPr>
+          <p:cNvSpPr>
+            <a:spLocks noGrp="1"/>
+          </p:cNvSpPr>
+          <p:nvPr>
+            <p:ph type="title"/>
+          </p:nvPr>
+        </p:nvSpPr>
+        <p:spPr/>
+        <p:txBody>
+          <a:bodyPr/>
+          <a:lstStyle/>
+          <a:p>
+            <a:r>
+              <a:rPr lang="en-US" b="1"/>
+              <a:t>Key Recommendations for Churn Model</a:t>
+            </a:r>
+            <a:br>
+              <a:rPr lang="en-US" b="1"/>
+            </a:br>
+            <a:endParaRPr lang="en-US" dirty="0"/>
+          </a:p>
+        </p:txBody>
+      </p:sp>
+      <p:sp>
+        <p:nvSpPr>
+          <p:cNvPr id="3" name="Content Placeholder 2">
+            <a:extLst>
+              <a:ext uri="{FF2B5EF4-FFF2-40B4-BE49-F238E27FC236}">
+                <a16:creationId xmlns:a16="http://schemas.microsoft.com/office/drawing/2014/main" id="{66CDCB6A-73CF-EE3F-413C-84C615C2DE11}"/>
+              </a:ext>
+            </a:extLst>
+          </p:cNvPr>
+          <p:cNvSpPr>
+            <a:spLocks noGrp="1"/>
+          </p:cNvSpPr>
+          <p:nvPr>
+            <p:ph idx="1"/>
+          </p:nvPr>
+        </p:nvSpPr>
+        <p:spPr/>
+        <p:txBody>
+          <a:bodyPr>
+            <a:normAutofit lnSpcReduction="10000"/>
+          </a:bodyPr>
+          <a:lstStyle/>
+          <a:p>
+            <a:pPr>
+              <a:buFont typeface="Arial" panose="020B0604020202020204" pitchFamily="34" charset="0"/>
+              <a:buChar char="•"/>
+            </a:pPr>
+            <a:r>
+              <a:rPr lang="en-US" b="1" dirty="0"/>
+              <a:t>Address Imbalance</a:t>
+            </a:r>
+            <a:r>
+              <a:rPr lang="en-US" dirty="0"/>
+              <a:t>: Use SMOTE on training data; consider class weights.</a:t>
+            </a:r>
+          </a:p>
+          <a:p>
+            <a:pPr>
+              <a:buFont typeface="Arial" panose="020B0604020202020204" pitchFamily="34" charset="0"/>
+              <a:buChar char="•"/>
+            </a:pPr>
+            <a:r>
+              <a:rPr lang="en-US" b="1" dirty="0"/>
+              <a:t>Fairness</a:t>
+            </a:r>
+            <a:r>
+              <a:rPr lang="en-US" dirty="0"/>
+              <a:t>: Evaluate model bias across demographics.</a:t>
+            </a:r>
+          </a:p>
+          <a:p>
+            <a:pPr>
+              <a:buFont typeface="Arial" panose="020B0604020202020204" pitchFamily="34" charset="0"/>
+              <a:buChar char="•"/>
+            </a:pPr>
+            <a:r>
+              <a:rPr lang="en-US" b="1" dirty="0"/>
+              <a:t>Threshold Tuning</a:t>
+            </a:r>
+            <a:r>
+              <a:rPr lang="en-US" dirty="0"/>
+              <a:t>: Optimize with precision-recall balance.</a:t>
+            </a:r>
+          </a:p>
+          <a:p>
+            <a:pPr>
+              <a:buFont typeface="Arial" panose="020B0604020202020204" pitchFamily="34" charset="0"/>
+              <a:buChar char="•"/>
+            </a:pPr>
+            <a:r>
+              <a:rPr lang="en-US" b="1" dirty="0"/>
+              <a:t>Cross-Validation</a:t>
+            </a:r>
+            <a:r>
+              <a:rPr lang="en-US" dirty="0"/>
+              <a:t>: Ensure model generalizes well.</a:t>
+            </a:r>
+          </a:p>
+          <a:p>
+            <a:pPr>
+              <a:buFont typeface="Arial" panose="020B0604020202020204" pitchFamily="34" charset="0"/>
+              <a:buChar char="•"/>
+            </a:pPr>
+            <a:r>
+              <a:rPr lang="en-US" b="1" dirty="0"/>
+              <a:t>Telecom Insights</a:t>
+            </a:r>
+            <a:r>
+              <a:rPr lang="en-US" dirty="0"/>
+              <a:t>: Include usage, billing, and complaints data.</a:t>
+            </a:r>
+          </a:p>
+          <a:p>
+            <a:pPr>
+              <a:buFont typeface="Arial" panose="020B0604020202020204" pitchFamily="34" charset="0"/>
+              <a:buChar char="•"/>
+            </a:pPr>
+            <a:r>
+              <a:rPr lang="en-US" b="1" dirty="0"/>
+              <a:t>Model Deployment</a:t>
+            </a:r>
+            <a:r>
+              <a:rPr lang="en-US" dirty="0"/>
+              <a:t>: Enable real-time churn prediction &amp; retraining.</a:t>
+            </a:r>
+          </a:p>
+          <a:p>
+            <a:pPr>
+              <a:buFont typeface="Arial" panose="020B0604020202020204" pitchFamily="34" charset="0"/>
+              <a:buChar char="•"/>
+            </a:pPr>
+            <a:r>
+              <a:rPr lang="en-US" b="1" dirty="0"/>
+              <a:t>Transparency</a:t>
+            </a:r>
+            <a:r>
+              <a:rPr lang="en-US" dirty="0"/>
+              <a:t>: Communicate churn drivers clearly.</a:t>
+            </a:r>
+          </a:p>
+          <a:p>
+            <a:pPr>
+              <a:buFont typeface="Arial" panose="020B0604020202020204" pitchFamily="34" charset="0"/>
+              <a:buChar char="•"/>
+            </a:pPr>
+            <a:r>
+              <a:rPr lang="en-US" b="1" dirty="0"/>
+              <a:t>Integration</a:t>
+            </a:r>
+            <a:r>
+              <a:rPr lang="en-US" dirty="0"/>
+              <a:t>: Automate with CRM systems for actionability.</a:t>
+            </a:r>
+          </a:p>
+          <a:p>
+            <a:pPr>
+              <a:buNone/>
+            </a:pPr>
+            <a:endParaRPr lang="en-US" b="1" dirty="0"/>
+          </a:p>
+        </p:txBody>
+      </p:sp>
+    </p:spTree>
+    <p:extLst>
+      <p:ext uri="{BB962C8B-B14F-4D97-AF65-F5344CB8AC3E}">
+        <p14:creationId xmlns:p14="http://schemas.microsoft.com/office/powerpoint/2010/main" val="2049208278"/>
       </p:ext>
     </p:extLst>
   </p:cSld>

</xml_diff>